<commit_message>
Added section on link budget
</commit_message>
<xml_diff>
--- a/CMQA/Presentations/Fixed Design Presentation.pptx
+++ b/CMQA/Presentations/Fixed Design Presentation.pptx
@@ -6,7 +6,7 @@
     <p:sldMasterId id="2147483649" r:id="rId2"/>
   </p:sldMasterIdLst>
   <p:notesMasterIdLst>
-    <p:notesMasterId r:id="rId12"/>
+    <p:notesMasterId r:id="rId14"/>
   </p:notesMasterIdLst>
   <p:sldIdLst>
     <p:sldId id="256" r:id="rId3"/>
@@ -18,6 +18,8 @@
     <p:sldId id="264" r:id="rId9"/>
     <p:sldId id="265" r:id="rId10"/>
     <p:sldId id="266" r:id="rId11"/>
+    <p:sldId id="267" r:id="rId12"/>
+    <p:sldId id="268" r:id="rId13"/>
   </p:sldIdLst>
   <p:sldSz cx="10075863" cy="7562850"/>
   <p:notesSz cx="7772400" cy="10058400"/>
@@ -10543,6 +10545,625 @@
             </p:seq>
           </p:childTnLst>
         </p:cTn>
+      </p:par>
+    </p:tnLst>
+  </p:timing>
+</p:sld>
+</file>
+
+<file path=ppt/slides/slide10.xml><?xml version="1.0" encoding="utf-8"?>
+<p:sld xmlns:a="http://schemas.openxmlformats.org/drawingml/2006/main" xmlns:r="http://schemas.openxmlformats.org/officeDocument/2006/relationships" xmlns:p="http://schemas.openxmlformats.org/presentationml/2006/main">
+  <p:cSld>
+    <p:spTree>
+      <p:nvGrpSpPr>
+        <p:cNvPr id="1" name=""/>
+        <p:cNvGrpSpPr/>
+        <p:nvPr/>
+      </p:nvGrpSpPr>
+      <p:grpSpPr>
+        <a:xfrm>
+          <a:off x="0" y="0"/>
+          <a:ext cx="0" cy="0"/>
+          <a:chOff x="0" y="0"/>
+          <a:chExt cx="0" cy="0"/>
+        </a:xfrm>
+      </p:grpSpPr>
+      <p:sp>
+        <p:nvSpPr>
+          <p:cNvPr id="2" name="Title 1"/>
+          <p:cNvSpPr>
+            <a:spLocks noGrp="1"/>
+          </p:cNvSpPr>
+          <p:nvPr>
+            <p:ph type="title"/>
+          </p:nvPr>
+        </p:nvSpPr>
+        <p:spPr/>
+        <p:txBody>
+          <a:bodyPr/>
+          <a:lstStyle/>
+          <a:p>
+            <a:r>
+              <a:rPr lang="en-US" dirty="0" smtClean="0">
+                <a:solidFill>
+                  <a:schemeClr val="tx1"/>
+                </a:solidFill>
+              </a:rPr>
+              <a:t>Radio Analysis</a:t>
+            </a:r>
+            <a:endParaRPr lang="en-US" dirty="0">
+              <a:solidFill>
+                <a:schemeClr val="tx1"/>
+              </a:solidFill>
+            </a:endParaRPr>
+          </a:p>
+        </p:txBody>
+      </p:sp>
+      <p:sp>
+        <p:nvSpPr>
+          <p:cNvPr id="3" name="Content Placeholder 2"/>
+          <p:cNvSpPr>
+            <a:spLocks noGrp="1"/>
+          </p:cNvSpPr>
+          <p:nvPr>
+            <p:ph idx="1"/>
+          </p:nvPr>
+        </p:nvSpPr>
+        <p:spPr/>
+        <p:txBody>
+          <a:bodyPr numCol="2"/>
+          <a:lstStyle/>
+          <a:p>
+            <a:pPr>
+              <a:buFont typeface="Arial" pitchFamily="34" charset="0"/>
+              <a:buChar char="•"/>
+            </a:pPr>
+            <a:r>
+              <a:rPr lang="en-US" dirty="0" smtClean="0">
+                <a:solidFill>
+                  <a:schemeClr val="tx1"/>
+                </a:solidFill>
+              </a:rPr>
+              <a:t>SLU Ground Station</a:t>
+            </a:r>
+          </a:p>
+          <a:p>
+            <a:pPr lvl="1">
+              <a:buFont typeface="Arial" pitchFamily="34" charset="0"/>
+              <a:buChar char="•"/>
+            </a:pPr>
+            <a:r>
+              <a:rPr lang="en-US" sz="2000" dirty="0" smtClean="0">
+                <a:solidFill>
+                  <a:schemeClr val="tx1"/>
+                </a:solidFill>
+              </a:rPr>
+              <a:t>100 W Transmit Power</a:t>
+            </a:r>
+          </a:p>
+          <a:p>
+            <a:pPr lvl="1">
+              <a:buFont typeface="Arial" pitchFamily="34" charset="0"/>
+              <a:buChar char="•"/>
+            </a:pPr>
+            <a:r>
+              <a:rPr lang="en-US" sz="2000" dirty="0" smtClean="0">
+                <a:solidFill>
+                  <a:schemeClr val="tx1"/>
+                </a:solidFill>
+              </a:rPr>
+              <a:t>15 dB Gain</a:t>
+            </a:r>
+          </a:p>
+          <a:p>
+            <a:pPr>
+              <a:buFont typeface="Arial" pitchFamily="34" charset="0"/>
+              <a:buChar char="•"/>
+            </a:pPr>
+            <a:r>
+              <a:rPr lang="en-US" dirty="0" smtClean="0">
+                <a:solidFill>
+                  <a:schemeClr val="tx1"/>
+                </a:solidFill>
+              </a:rPr>
+              <a:t>Propagation Range</a:t>
+            </a:r>
+          </a:p>
+          <a:p>
+            <a:pPr lvl="1">
+              <a:buFont typeface="Arial" pitchFamily="34" charset="0"/>
+              <a:buChar char="•"/>
+            </a:pPr>
+            <a:r>
+              <a:rPr lang="en-US" sz="2000" dirty="0" smtClean="0">
+                <a:solidFill>
+                  <a:schemeClr val="tx1"/>
+                </a:solidFill>
+                <a:latin typeface="+mj-lt"/>
+              </a:rPr>
+              <a:t>300 km Altitude</a:t>
+            </a:r>
+          </a:p>
+          <a:p>
+            <a:pPr lvl="1">
+              <a:buFont typeface="Arial" pitchFamily="34" charset="0"/>
+              <a:buChar char="•"/>
+            </a:pPr>
+            <a:r>
+              <a:rPr lang="en-US" sz="2000" dirty="0" smtClean="0">
+                <a:solidFill>
+                  <a:schemeClr val="tx1"/>
+                </a:solidFill>
+                <a:latin typeface="+mj-lt"/>
+              </a:rPr>
+              <a:t>5⁰ Elevation Angle</a:t>
+            </a:r>
+          </a:p>
+          <a:p>
+            <a:pPr>
+              <a:buFont typeface="Arial" pitchFamily="34" charset="0"/>
+              <a:buChar char="•"/>
+            </a:pPr>
+            <a:r>
+              <a:rPr lang="en-US" dirty="0" smtClean="0">
+                <a:solidFill>
+                  <a:srgbClr val="008000"/>
+                </a:solidFill>
+              </a:rPr>
+              <a:t>UHF Radio</a:t>
+            </a:r>
+          </a:p>
+          <a:p>
+            <a:pPr lvl="1">
+              <a:buFont typeface="Arial" pitchFamily="34" charset="0"/>
+              <a:buChar char="•"/>
+            </a:pPr>
+            <a:r>
+              <a:rPr lang="en-US" sz="2000" dirty="0" smtClean="0">
+                <a:solidFill>
+                  <a:schemeClr val="tx1"/>
+                </a:solidFill>
+              </a:rPr>
+              <a:t>440 MHz</a:t>
+            </a:r>
+          </a:p>
+          <a:p>
+            <a:pPr lvl="1">
+              <a:buFont typeface="Arial" pitchFamily="34" charset="0"/>
+              <a:buChar char="•"/>
+            </a:pPr>
+            <a:r>
+              <a:rPr lang="en-US" sz="2000" dirty="0" smtClean="0">
+                <a:solidFill>
+                  <a:schemeClr val="tx1"/>
+                </a:solidFill>
+              </a:rPr>
+              <a:t>5 W Transmit Power</a:t>
+            </a:r>
+          </a:p>
+          <a:p>
+            <a:pPr lvl="1">
+              <a:buFont typeface="Arial" pitchFamily="34" charset="0"/>
+              <a:buChar char="•"/>
+            </a:pPr>
+            <a:r>
+              <a:rPr lang="en-US" sz="2000" dirty="0" smtClean="0">
+                <a:solidFill>
+                  <a:schemeClr val="tx1"/>
+                </a:solidFill>
+              </a:rPr>
+              <a:t>5 dB Gain</a:t>
+            </a:r>
+          </a:p>
+          <a:p>
+            <a:pPr lvl="1">
+              <a:buFont typeface="Arial" pitchFamily="34" charset="0"/>
+              <a:buChar char="•"/>
+            </a:pPr>
+            <a:r>
+              <a:rPr lang="en-US" sz="2000" dirty="0" smtClean="0">
+                <a:solidFill>
+                  <a:schemeClr val="tx1"/>
+                </a:solidFill>
+              </a:rPr>
+              <a:t>Downlink: 100kbps</a:t>
+            </a:r>
+          </a:p>
+          <a:p>
+            <a:pPr lvl="1">
+              <a:buFont typeface="Arial" pitchFamily="34" charset="0"/>
+              <a:buChar char="•"/>
+            </a:pPr>
+            <a:r>
+              <a:rPr lang="en-US" sz="2000" dirty="0" smtClean="0">
+                <a:solidFill>
+                  <a:schemeClr val="tx1"/>
+                </a:solidFill>
+              </a:rPr>
+              <a:t>Uplink: 4 kbps</a:t>
+            </a:r>
+          </a:p>
+          <a:p>
+            <a:pPr lvl="1">
+              <a:buFont typeface="Arial" pitchFamily="34" charset="0"/>
+              <a:buChar char="•"/>
+            </a:pPr>
+            <a:r>
+              <a:rPr lang="en-US" sz="2000" dirty="0" smtClean="0">
+                <a:solidFill>
+                  <a:schemeClr val="tx1"/>
+                </a:solidFill>
+              </a:rPr>
+              <a:t>Signal-to-Noise Ratio: 13.47 dB</a:t>
+            </a:r>
+          </a:p>
+          <a:p>
+            <a:pPr>
+              <a:buFont typeface="Arial" pitchFamily="34" charset="0"/>
+              <a:buChar char="•"/>
+            </a:pPr>
+            <a:r>
+              <a:rPr lang="en-US" dirty="0" smtClean="0">
+                <a:solidFill>
+                  <a:srgbClr val="CC0000"/>
+                </a:solidFill>
+              </a:rPr>
+              <a:t>S-Band Radio</a:t>
+            </a:r>
+          </a:p>
+          <a:p>
+            <a:pPr lvl="1">
+              <a:buFont typeface="Arial" pitchFamily="34" charset="0"/>
+              <a:buChar char="•"/>
+            </a:pPr>
+            <a:r>
+              <a:rPr lang="en-US" sz="2000" dirty="0" smtClean="0">
+                <a:solidFill>
+                  <a:schemeClr val="tx1"/>
+                </a:solidFill>
+              </a:rPr>
+              <a:t>2.4 GHz</a:t>
+            </a:r>
+            <a:endParaRPr lang="en-US" sz="2000" dirty="0" smtClean="0">
+              <a:solidFill>
+                <a:schemeClr val="tx1"/>
+              </a:solidFill>
+            </a:endParaRPr>
+          </a:p>
+          <a:p>
+            <a:pPr lvl="1">
+              <a:buFont typeface="Arial" pitchFamily="34" charset="0"/>
+              <a:buChar char="•"/>
+            </a:pPr>
+            <a:r>
+              <a:rPr lang="en-US" sz="2000" dirty="0" smtClean="0">
+                <a:solidFill>
+                  <a:schemeClr val="tx1"/>
+                </a:solidFill>
+              </a:rPr>
+              <a:t>5 W Transmit Power</a:t>
+            </a:r>
+          </a:p>
+          <a:p>
+            <a:pPr lvl="1">
+              <a:buFont typeface="Arial" pitchFamily="34" charset="0"/>
+              <a:buChar char="•"/>
+            </a:pPr>
+            <a:r>
+              <a:rPr lang="en-US" sz="2000" dirty="0" smtClean="0">
+                <a:solidFill>
+                  <a:schemeClr val="tx1"/>
+                </a:solidFill>
+              </a:rPr>
+              <a:t>5 dB Gain</a:t>
+            </a:r>
+          </a:p>
+          <a:p>
+            <a:pPr lvl="1">
+              <a:buFont typeface="Arial" pitchFamily="34" charset="0"/>
+              <a:buChar char="•"/>
+            </a:pPr>
+            <a:r>
+              <a:rPr lang="en-US" sz="2000" dirty="0" smtClean="0">
+                <a:solidFill>
+                  <a:schemeClr val="tx1"/>
+                </a:solidFill>
+              </a:rPr>
+              <a:t>Downlink: </a:t>
+            </a:r>
+            <a:r>
+              <a:rPr lang="en-US" sz="2000" dirty="0" smtClean="0">
+                <a:solidFill>
+                  <a:schemeClr val="tx1"/>
+                </a:solidFill>
+              </a:rPr>
+              <a:t>1.1 Mbps</a:t>
+            </a:r>
+            <a:endParaRPr lang="en-US" sz="2000" dirty="0" smtClean="0">
+              <a:solidFill>
+                <a:schemeClr val="tx1"/>
+              </a:solidFill>
+            </a:endParaRPr>
+          </a:p>
+          <a:p>
+            <a:pPr lvl="1">
+              <a:buFont typeface="Arial" pitchFamily="34" charset="0"/>
+              <a:buChar char="•"/>
+            </a:pPr>
+            <a:r>
+              <a:rPr lang="en-US" sz="2000" dirty="0" smtClean="0">
+                <a:solidFill>
+                  <a:schemeClr val="tx1"/>
+                </a:solidFill>
+              </a:rPr>
+              <a:t>Uplink: 4 </a:t>
+            </a:r>
+            <a:r>
+              <a:rPr lang="en-US" sz="2000" dirty="0" smtClean="0">
+                <a:solidFill>
+                  <a:schemeClr val="tx1"/>
+                </a:solidFill>
+              </a:rPr>
+              <a:t>kbps</a:t>
+            </a:r>
+          </a:p>
+          <a:p>
+            <a:pPr lvl="1">
+              <a:buFont typeface="Arial" pitchFamily="34" charset="0"/>
+              <a:buChar char="•"/>
+            </a:pPr>
+            <a:r>
+              <a:rPr lang="en-US" sz="2000" dirty="0" smtClean="0">
+                <a:solidFill>
+                  <a:schemeClr val="tx1"/>
+                </a:solidFill>
+              </a:rPr>
+              <a:t>Signal-to-Noise Ratio: </a:t>
+            </a:r>
+            <a:r>
+              <a:rPr lang="en-US" sz="2000" dirty="0" smtClean="0">
+                <a:solidFill>
+                  <a:schemeClr val="tx1"/>
+                </a:solidFill>
+              </a:rPr>
+              <a:t>-4.17 dB</a:t>
+            </a:r>
+          </a:p>
+          <a:p>
+            <a:pPr>
+              <a:buFont typeface="Arial" pitchFamily="34" charset="0"/>
+              <a:buChar char="•"/>
+            </a:pPr>
+            <a:endParaRPr lang="en-US" sz="1600" dirty="0" smtClean="0">
+              <a:solidFill>
+                <a:schemeClr val="tx1"/>
+              </a:solidFill>
+            </a:endParaRPr>
+          </a:p>
+        </p:txBody>
+      </p:sp>
+      <p:sp>
+        <p:nvSpPr>
+          <p:cNvPr id="4" name="Date Placeholder 3"/>
+          <p:cNvSpPr>
+            <a:spLocks noGrp="1"/>
+          </p:cNvSpPr>
+          <p:nvPr>
+            <p:ph type="dt" idx="10"/>
+          </p:nvPr>
+        </p:nvSpPr>
+        <p:spPr/>
+        <p:txBody>
+          <a:bodyPr/>
+          <a:lstStyle/>
+          <a:p>
+            <a:pPr>
+              <a:defRPr/>
+            </a:pPr>
+            <a:fld id="{E485CC1E-7845-45DD-A2E1-72F20693BE6B}" type="datetime1">
+              <a:rPr lang="en-US" altLang="en-US" smtClean="0"/>
+              <a:pPr>
+                <a:defRPr/>
+              </a:pPr>
+              <a:t>2/19/2014</a:t>
+            </a:fld>
+            <a:endParaRPr lang="en-US" altLang="en-US"/>
+          </a:p>
+        </p:txBody>
+      </p:sp>
+      <p:sp>
+        <p:nvSpPr>
+          <p:cNvPr id="5" name="Footer Placeholder 4"/>
+          <p:cNvSpPr>
+            <a:spLocks noGrp="1"/>
+          </p:cNvSpPr>
+          <p:nvPr>
+            <p:ph type="ftr" idx="11"/>
+          </p:nvPr>
+        </p:nvSpPr>
+        <p:spPr/>
+        <p:txBody>
+          <a:bodyPr/>
+          <a:lstStyle/>
+          <a:p>
+            <a:pPr>
+              <a:defRPr/>
+            </a:pPr>
+            <a:r>
+              <a:rPr lang="en-US" altLang="en-US" smtClean="0"/>
+              <a:t>Team Bravo</a:t>
+            </a:r>
+            <a:endParaRPr lang="en-US" altLang="en-US"/>
+          </a:p>
+        </p:txBody>
+      </p:sp>
+      <p:sp>
+        <p:nvSpPr>
+          <p:cNvPr id="6" name="Slide Number Placeholder 5"/>
+          <p:cNvSpPr>
+            <a:spLocks noGrp="1"/>
+          </p:cNvSpPr>
+          <p:nvPr>
+            <p:ph type="sldNum" idx="12"/>
+          </p:nvPr>
+        </p:nvSpPr>
+        <p:spPr/>
+        <p:txBody>
+          <a:bodyPr/>
+          <a:lstStyle/>
+          <a:p>
+            <a:pPr>
+              <a:defRPr/>
+            </a:pPr>
+            <a:fld id="{8C6E2802-7AC4-44BB-B0A5-E12803E0614A}" type="slidenum">
+              <a:rPr lang="en-US" altLang="en-US" smtClean="0"/>
+              <a:pPr>
+                <a:defRPr/>
+              </a:pPr>
+              <a:t>10</a:t>
+            </a:fld>
+            <a:endParaRPr lang="en-US" altLang="en-US" dirty="0"/>
+          </a:p>
+        </p:txBody>
+      </p:sp>
+    </p:spTree>
+  </p:cSld>
+  <p:clrMapOvr>
+    <a:masterClrMapping/>
+  </p:clrMapOvr>
+</p:sld>
+</file>
+
+<file path=ppt/slides/slide11.xml><?xml version="1.0" encoding="utf-8"?>
+<p:sld xmlns:a="http://schemas.openxmlformats.org/drawingml/2006/main" xmlns:r="http://schemas.openxmlformats.org/officeDocument/2006/relationships" xmlns:p="http://schemas.openxmlformats.org/presentationml/2006/main">
+  <p:cSld>
+    <p:spTree>
+      <p:nvGrpSpPr>
+        <p:cNvPr id="1" name=""/>
+        <p:cNvGrpSpPr/>
+        <p:nvPr/>
+      </p:nvGrpSpPr>
+      <p:grpSpPr>
+        <a:xfrm>
+          <a:off x="0" y="0"/>
+          <a:ext cx="0" cy="0"/>
+          <a:chOff x="0" y="0"/>
+          <a:chExt cx="0" cy="0"/>
+        </a:xfrm>
+      </p:grpSpPr>
+      <p:sp>
+        <p:nvSpPr>
+          <p:cNvPr id="2" name="Subtitle 1"/>
+          <p:cNvSpPr>
+            <a:spLocks noGrp="1"/>
+          </p:cNvSpPr>
+          <p:nvPr>
+            <p:ph type="subTitle" idx="1"/>
+          </p:nvPr>
+        </p:nvSpPr>
+        <p:spPr>
+          <a:xfrm>
+            <a:off x="1456531" y="971338"/>
+            <a:ext cx="7053104" cy="6591512"/>
+          </a:xfrm>
+        </p:spPr>
+        <p:txBody>
+          <a:bodyPr/>
+          <a:lstStyle/>
+          <a:p>
+            <a:r>
+              <a:rPr lang="en-US" sz="3200" dirty="0" smtClean="0">
+                <a:solidFill>
+                  <a:schemeClr val="bg1">
+                    <a:lumMod val="65000"/>
+                  </a:schemeClr>
+                </a:solidFill>
+              </a:rPr>
+              <a:t>Project Overview</a:t>
+            </a:r>
+          </a:p>
+          <a:p>
+            <a:r>
+              <a:rPr lang="en-US" sz="3200" dirty="0" smtClean="0">
+                <a:solidFill>
+                  <a:schemeClr val="bg1">
+                    <a:lumMod val="65000"/>
+                  </a:schemeClr>
+                </a:solidFill>
+              </a:rPr>
+              <a:t>Design </a:t>
+            </a:r>
+            <a:r>
+              <a:rPr lang="en-US" sz="3200" dirty="0" smtClean="0">
+                <a:solidFill>
+                  <a:schemeClr val="bg1">
+                    <a:lumMod val="65000"/>
+                  </a:schemeClr>
+                </a:solidFill>
+              </a:rPr>
+              <a:t>Constraints</a:t>
+            </a:r>
+          </a:p>
+          <a:p>
+            <a:r>
+              <a:rPr lang="en-US" sz="3200" dirty="0" smtClean="0">
+                <a:solidFill>
+                  <a:schemeClr val="tx1"/>
+                </a:solidFill>
+              </a:rPr>
+              <a:t>Mission </a:t>
+            </a:r>
+            <a:r>
+              <a:rPr lang="en-US" sz="3200" dirty="0" smtClean="0">
+                <a:solidFill>
+                  <a:schemeClr val="tx1"/>
+                </a:solidFill>
+              </a:rPr>
+              <a:t>Design</a:t>
+            </a:r>
+          </a:p>
+          <a:p>
+            <a:endParaRPr lang="en-US" sz="4000" dirty="0">
+              <a:solidFill>
+                <a:schemeClr val="bg1">
+                  <a:lumMod val="65000"/>
+                </a:schemeClr>
+              </a:solidFill>
+            </a:endParaRPr>
+          </a:p>
+          <a:p>
+            <a:endParaRPr lang="en-US" dirty="0" smtClean="0">
+              <a:solidFill>
+                <a:schemeClr val="bg1">
+                  <a:lumMod val="65000"/>
+                </a:schemeClr>
+              </a:solidFill>
+            </a:endParaRPr>
+          </a:p>
+        </p:txBody>
+      </p:sp>
+    </p:spTree>
+    <p:extLst>
+      <p:ext uri="{BB962C8B-B14F-4D97-AF65-F5344CB8AC3E}">
+        <p14:creationId xmlns:p14="http://schemas.microsoft.com/office/powerpoint/2010/main" xmlns="" val="1899034955"/>
+      </p:ext>
+    </p:extLst>
+  </p:cSld>
+  <p:clrMapOvr>
+    <a:masterClrMapping/>
+  </p:clrMapOvr>
+  <mc:AlternateContent xmlns:mc="http://schemas.openxmlformats.org/markup-compatibility/2006">
+    <mc:Choice xmlns:p14="http://schemas.microsoft.com/office/powerpoint/2010/main" xmlns="" Requires="p14">
+      <p:transition spd="slow" p14:dur="2000" advTm="1200"/>
+    </mc:Choice>
+    <mc:Fallback>
+      <p:transition spd="slow" advTm="1200"/>
+    </mc:Fallback>
+  </mc:AlternateContent>
+  <p:timing>
+    <p:tnLst>
+      <p:par>
+        <p:cTn id="1" dur="indefinite" restart="never" nodeType="tmRoot"/>
       </p:par>
     </p:tnLst>
   </p:timing>

</xml_diff>